<commit_message>
Presentation - Zhida Zhang
</commit_message>
<xml_diff>
--- a/Team 3/Developer/Presentation_SAP_Zhida_Zhang.pptx
+++ b/Team 3/Developer/Presentation_SAP_Zhida_Zhang.pptx
@@ -5213,8 +5213,12 @@
           </a:p>
           <a:p>
             <a:r>
+              <a:rPr lang="en-US" b="1" dirty="0"/>
+              <a:t>Most important part</a:t>
+            </a:r>
+            <a:r>
               <a:rPr lang="en-US" dirty="0"/>
-              <a:t>Most important part: communication with the frontend teammate and data science teammate, to know what they need, so that we have consensus on the interface, so that each teammate can work independently and efficiently.  </a:t>
+              <a:t>: communication with the frontend teammate and data science teammate, to know what they need, so that we have consensus on the interface, so that each teammate can work independently and efficiently.  </a:t>
             </a:r>
           </a:p>
           <a:p>

</xml_diff>